<commit_message>
Added structure of the mock-up
</commit_message>
<xml_diff>
--- a/Drafts & Material/IDM Models + Notes.pptx
+++ b/Drafts & Material/IDM Models + Notes.pptx
@@ -5,7 +5,7 @@
     <p:sldMasterId id="2147483648" r:id="rId1"/>
   </p:sldMasterIdLst>
   <p:notesMasterIdLst>
-    <p:notesMasterId r:id="rId14"/>
+    <p:notesMasterId r:id="rId15"/>
   </p:notesMasterIdLst>
   <p:sldIdLst>
     <p:sldId id="268" r:id="rId2"/>
@@ -18,8 +18,9 @@
     <p:sldId id="262" r:id="rId9"/>
     <p:sldId id="266" r:id="rId10"/>
     <p:sldId id="267" r:id="rId11"/>
-    <p:sldId id="270" r:id="rId12"/>
-    <p:sldId id="271" r:id="rId13"/>
+    <p:sldId id="272" r:id="rId12"/>
+    <p:sldId id="270" r:id="rId13"/>
+    <p:sldId id="271" r:id="rId14"/>
   </p:sldIdLst>
   <p:sldSz cx="12192000" cy="6858000"/>
   <p:notesSz cx="6858000" cy="9144000"/>
@@ -3662,12 +3663,6 @@
               </a:rPr>
               <a:t>)</a:t>
             </a:r>
-            <a:endParaRPr lang="it-IT" sz="1600" i="1" dirty="0" smtClean="0">
-              <a:solidFill>
-                <a:srgbClr val="870CA8"/>
-              </a:solidFill>
-              <a:latin typeface="Cambria" panose="02040503050406030204" pitchFamily="18" charset="0"/>
-            </a:endParaRPr>
           </a:p>
           <a:p>
             <a:r>
@@ -3943,6 +3938,287 @@
       </p:grpSpPr>
       <p:sp>
         <p:nvSpPr>
+          <p:cNvPr id="4" name="Segnaposto contenuto 4"/>
+          <p:cNvSpPr txBox="1">
+            <a:spLocks/>
+          </p:cNvSpPr>
+          <p:nvPr/>
+        </p:nvSpPr>
+        <p:spPr>
+          <a:xfrm>
+            <a:off x="681446" y="452846"/>
+            <a:ext cx="8384177" cy="801188"/>
+          </a:xfrm>
+          <a:prstGeom prst="rect">
+            <a:avLst/>
+          </a:prstGeom>
+        </p:spPr>
+        <p:txBody>
+          <a:bodyPr vert="horz" lIns="91440" tIns="45720" rIns="91440" bIns="45720" rtlCol="0">
+            <a:normAutofit/>
+          </a:bodyPr>
+          <a:lstStyle>
+            <a:lvl1pPr marL="228600" indent="-228600" algn="l" defTabSz="914400" rtl="0" eaLnBrk="1" latinLnBrk="0" hangingPunct="1">
+              <a:lnSpc>
+                <a:spcPct val="90000"/>
+              </a:lnSpc>
+              <a:spcBef>
+                <a:spcPts val="1000"/>
+              </a:spcBef>
+              <a:buFont typeface="Arial" panose="020B0604020202020204" pitchFamily="34" charset="0"/>
+              <a:buChar char="•"/>
+              <a:defRPr sz="2800" kern="1200">
+                <a:solidFill>
+                  <a:schemeClr val="tx1"/>
+                </a:solidFill>
+                <a:latin typeface="+mn-lt"/>
+                <a:ea typeface="+mn-ea"/>
+                <a:cs typeface="+mn-cs"/>
+              </a:defRPr>
+            </a:lvl1pPr>
+            <a:lvl2pPr marL="685800" indent="-228600" algn="l" defTabSz="914400" rtl="0" eaLnBrk="1" latinLnBrk="0" hangingPunct="1">
+              <a:lnSpc>
+                <a:spcPct val="90000"/>
+              </a:lnSpc>
+              <a:spcBef>
+                <a:spcPts val="500"/>
+              </a:spcBef>
+              <a:buFont typeface="Arial" panose="020B0604020202020204" pitchFamily="34" charset="0"/>
+              <a:buChar char="•"/>
+              <a:defRPr sz="2400" kern="1200">
+                <a:solidFill>
+                  <a:schemeClr val="tx1"/>
+                </a:solidFill>
+                <a:latin typeface="+mn-lt"/>
+                <a:ea typeface="+mn-ea"/>
+                <a:cs typeface="+mn-cs"/>
+              </a:defRPr>
+            </a:lvl2pPr>
+            <a:lvl3pPr marL="1143000" indent="-228600" algn="l" defTabSz="914400" rtl="0" eaLnBrk="1" latinLnBrk="0" hangingPunct="1">
+              <a:lnSpc>
+                <a:spcPct val="90000"/>
+              </a:lnSpc>
+              <a:spcBef>
+                <a:spcPts val="500"/>
+              </a:spcBef>
+              <a:buFont typeface="Arial" panose="020B0604020202020204" pitchFamily="34" charset="0"/>
+              <a:buChar char="•"/>
+              <a:defRPr sz="2000" kern="1200">
+                <a:solidFill>
+                  <a:schemeClr val="tx1"/>
+                </a:solidFill>
+                <a:latin typeface="+mn-lt"/>
+                <a:ea typeface="+mn-ea"/>
+                <a:cs typeface="+mn-cs"/>
+              </a:defRPr>
+            </a:lvl3pPr>
+            <a:lvl4pPr marL="1600200" indent="-228600" algn="l" defTabSz="914400" rtl="0" eaLnBrk="1" latinLnBrk="0" hangingPunct="1">
+              <a:lnSpc>
+                <a:spcPct val="90000"/>
+              </a:lnSpc>
+              <a:spcBef>
+                <a:spcPts val="500"/>
+              </a:spcBef>
+              <a:buFont typeface="Arial" panose="020B0604020202020204" pitchFamily="34" charset="0"/>
+              <a:buChar char="•"/>
+              <a:defRPr sz="1800" kern="1200">
+                <a:solidFill>
+                  <a:schemeClr val="tx1"/>
+                </a:solidFill>
+                <a:latin typeface="+mn-lt"/>
+                <a:ea typeface="+mn-ea"/>
+                <a:cs typeface="+mn-cs"/>
+              </a:defRPr>
+            </a:lvl4pPr>
+            <a:lvl5pPr marL="2057400" indent="-228600" algn="l" defTabSz="914400" rtl="0" eaLnBrk="1" latinLnBrk="0" hangingPunct="1">
+              <a:lnSpc>
+                <a:spcPct val="90000"/>
+              </a:lnSpc>
+              <a:spcBef>
+                <a:spcPts val="500"/>
+              </a:spcBef>
+              <a:buFont typeface="Arial" panose="020B0604020202020204" pitchFamily="34" charset="0"/>
+              <a:buChar char="•"/>
+              <a:defRPr sz="1800" kern="1200">
+                <a:solidFill>
+                  <a:schemeClr val="tx1"/>
+                </a:solidFill>
+                <a:latin typeface="+mn-lt"/>
+                <a:ea typeface="+mn-ea"/>
+                <a:cs typeface="+mn-cs"/>
+              </a:defRPr>
+            </a:lvl5pPr>
+            <a:lvl6pPr marL="2514600" indent="-228600" algn="l" defTabSz="914400" rtl="0" eaLnBrk="1" latinLnBrk="0" hangingPunct="1">
+              <a:lnSpc>
+                <a:spcPct val="90000"/>
+              </a:lnSpc>
+              <a:spcBef>
+                <a:spcPts val="500"/>
+              </a:spcBef>
+              <a:buFont typeface="Arial" panose="020B0604020202020204" pitchFamily="34" charset="0"/>
+              <a:buChar char="•"/>
+              <a:defRPr sz="1800" kern="1200">
+                <a:solidFill>
+                  <a:schemeClr val="tx1"/>
+                </a:solidFill>
+                <a:latin typeface="+mn-lt"/>
+                <a:ea typeface="+mn-ea"/>
+                <a:cs typeface="+mn-cs"/>
+              </a:defRPr>
+            </a:lvl6pPr>
+            <a:lvl7pPr marL="2971800" indent="-228600" algn="l" defTabSz="914400" rtl="0" eaLnBrk="1" latinLnBrk="0" hangingPunct="1">
+              <a:lnSpc>
+                <a:spcPct val="90000"/>
+              </a:lnSpc>
+              <a:spcBef>
+                <a:spcPts val="500"/>
+              </a:spcBef>
+              <a:buFont typeface="Arial" panose="020B0604020202020204" pitchFamily="34" charset="0"/>
+              <a:buChar char="•"/>
+              <a:defRPr sz="1800" kern="1200">
+                <a:solidFill>
+                  <a:schemeClr val="tx1"/>
+                </a:solidFill>
+                <a:latin typeface="+mn-lt"/>
+                <a:ea typeface="+mn-ea"/>
+                <a:cs typeface="+mn-cs"/>
+              </a:defRPr>
+            </a:lvl7pPr>
+            <a:lvl8pPr marL="3429000" indent="-228600" algn="l" defTabSz="914400" rtl="0" eaLnBrk="1" latinLnBrk="0" hangingPunct="1">
+              <a:lnSpc>
+                <a:spcPct val="90000"/>
+              </a:lnSpc>
+              <a:spcBef>
+                <a:spcPts val="500"/>
+              </a:spcBef>
+              <a:buFont typeface="Arial" panose="020B0604020202020204" pitchFamily="34" charset="0"/>
+              <a:buChar char="•"/>
+              <a:defRPr sz="1800" kern="1200">
+                <a:solidFill>
+                  <a:schemeClr val="tx1"/>
+                </a:solidFill>
+                <a:latin typeface="+mn-lt"/>
+                <a:ea typeface="+mn-ea"/>
+                <a:cs typeface="+mn-cs"/>
+              </a:defRPr>
+            </a:lvl8pPr>
+            <a:lvl9pPr marL="3886200" indent="-228600" algn="l" defTabSz="914400" rtl="0" eaLnBrk="1" latinLnBrk="0" hangingPunct="1">
+              <a:lnSpc>
+                <a:spcPct val="90000"/>
+              </a:lnSpc>
+              <a:spcBef>
+                <a:spcPts val="500"/>
+              </a:spcBef>
+              <a:buFont typeface="Arial" panose="020B0604020202020204" pitchFamily="34" charset="0"/>
+              <a:buChar char="•"/>
+              <a:defRPr sz="1800" kern="1200">
+                <a:solidFill>
+                  <a:schemeClr val="tx1"/>
+                </a:solidFill>
+                <a:latin typeface="+mn-lt"/>
+                <a:ea typeface="+mn-ea"/>
+                <a:cs typeface="+mn-cs"/>
+              </a:defRPr>
+            </a:lvl9pPr>
+          </a:lstStyle>
+          <a:p>
+            <a:pPr marL="0" indent="0">
+              <a:buFont typeface="Arial" panose="020B0604020202020204" pitchFamily="34" charset="0"/>
+              <a:buNone/>
+            </a:pPr>
+            <a:r>
+              <a:rPr lang="it-IT" b="1" dirty="0" smtClean="0"/>
+              <a:t>General </a:t>
+            </a:r>
+            <a:r>
+              <a:rPr lang="it-IT" b="1" dirty="0" err="1" smtClean="0"/>
+              <a:t>structure</a:t>
+            </a:r>
+            <a:r>
+              <a:rPr lang="it-IT" b="1" dirty="0" smtClean="0"/>
+              <a:t> of the </a:t>
+            </a:r>
+            <a:r>
+              <a:rPr lang="it-IT" b="1" dirty="0" err="1" smtClean="0"/>
+              <a:t>mock</a:t>
+            </a:r>
+            <a:r>
+              <a:rPr lang="it-IT" b="1" dirty="0" smtClean="0"/>
+              <a:t>-up </a:t>
+            </a:r>
+            <a:r>
+              <a:rPr lang="it-IT" b="1" dirty="0" err="1" smtClean="0"/>
+              <a:t>pages</a:t>
+            </a:r>
+            <a:r>
+              <a:rPr lang="it-IT" b="1" dirty="0" smtClean="0"/>
+              <a:t>:</a:t>
+            </a:r>
+          </a:p>
+        </p:txBody>
+      </p:sp>
+      <p:pic>
+        <p:nvPicPr>
+          <p:cNvPr id="5" name="Immagine 4"/>
+          <p:cNvPicPr>
+            <a:picLocks noChangeAspect="1"/>
+          </p:cNvPicPr>
+          <p:nvPr/>
+        </p:nvPicPr>
+        <p:blipFill>
+          <a:blip r:embed="rId2">
+            <a:extLst>
+              <a:ext uri="{28A0092B-C50C-407E-A947-70E740481C1C}">
+                <a14:useLocalDpi xmlns:a14="http://schemas.microsoft.com/office/drawing/2010/main" val="0"/>
+              </a:ext>
+            </a:extLst>
+          </a:blip>
+          <a:stretch>
+            <a:fillRect/>
+          </a:stretch>
+        </p:blipFill>
+        <p:spPr>
+          <a:xfrm>
+            <a:off x="2275113" y="1147354"/>
+            <a:ext cx="7130144" cy="5347609"/>
+          </a:xfrm>
+          <a:prstGeom prst="rect">
+            <a:avLst/>
+          </a:prstGeom>
+        </p:spPr>
+      </p:pic>
+    </p:spTree>
+    <p:extLst>
+      <p:ext uri="{BB962C8B-B14F-4D97-AF65-F5344CB8AC3E}">
+        <p14:creationId xmlns:p14="http://schemas.microsoft.com/office/powerpoint/2010/main" val="2840493161"/>
+      </p:ext>
+    </p:extLst>
+  </p:cSld>
+  <p:clrMapOvr>
+    <a:masterClrMapping/>
+  </p:clrMapOvr>
+</p:sld>
+</file>
+
+<file path=ppt/slides/slide12.xml><?xml version="1.0" encoding="utf-8"?>
+<p:sld xmlns:a="http://schemas.openxmlformats.org/drawingml/2006/main" xmlns:r="http://schemas.openxmlformats.org/officeDocument/2006/relationships" xmlns:p="http://schemas.openxmlformats.org/presentationml/2006/main">
+  <p:cSld>
+    <p:spTree>
+      <p:nvGrpSpPr>
+        <p:cNvPr id="1" name=""/>
+        <p:cNvGrpSpPr/>
+        <p:nvPr/>
+      </p:nvGrpSpPr>
+      <p:grpSpPr>
+        <a:xfrm>
+          <a:off x="0" y="0"/>
+          <a:ext cx="0" cy="0"/>
+          <a:chOff x="0" y="0"/>
+          <a:chExt cx="0" cy="0"/>
+        </a:xfrm>
+      </p:grpSpPr>
+      <p:sp>
+        <p:nvSpPr>
           <p:cNvPr id="5" name="Segnaposto contenuto 4"/>
           <p:cNvSpPr>
             <a:spLocks noGrp="1"/>
@@ -4112,7 +4388,7 @@
 </p:sld>
 </file>
 
-<file path=ppt/slides/slide12.xml><?xml version="1.0" encoding="utf-8"?>
+<file path=ppt/slides/slide13.xml><?xml version="1.0" encoding="utf-8"?>
 <p:sld xmlns:a="http://schemas.openxmlformats.org/drawingml/2006/main" xmlns:r="http://schemas.openxmlformats.org/officeDocument/2006/relationships" xmlns:p="http://schemas.openxmlformats.org/presentationml/2006/main">
   <p:cSld>
     <p:spTree>

</xml_diff>